<commit_message>
Update docs and  logo
</commit_message>
<xml_diff>
--- a/docs/myPresentation.pptx
+++ b/docs/myPresentation.pptx
@@ -2770,7 +2770,7 @@
         <p:spPr>
           <a:xfrm>
             <a:off x="0" y="6324480"/>
-            <a:ext cx="8731800" cy="322920"/>
+            <a:ext cx="8731440" cy="322560"/>
           </a:xfrm>
           <a:prstGeom prst="rect">
             <a:avLst/>
@@ -2794,7 +2794,7 @@
         <p:spPr>
           <a:xfrm>
             <a:off x="1941480" y="1609560"/>
-            <a:ext cx="7201440" cy="4637880"/>
+            <a:ext cx="7201080" cy="4637520"/>
           </a:xfrm>
           <a:prstGeom prst="rect">
             <a:avLst/>
@@ -2813,7 +2813,7 @@
         <p:spPr>
           <a:xfrm>
             <a:off x="457200" y="914400"/>
-            <a:ext cx="8685720" cy="227520"/>
+            <a:ext cx="8685360" cy="227160"/>
           </a:xfrm>
           <a:custGeom>
             <a:avLst/>
@@ -2873,7 +2873,7 @@
         <p:spPr>
           <a:xfrm>
             <a:off x="8190000" y="6415200"/>
-            <a:ext cx="1160280" cy="367560"/>
+            <a:ext cx="1159920" cy="367560"/>
           </a:xfrm>
           <a:custGeom>
             <a:avLst/>
@@ -2936,7 +2936,7 @@
                 <a:tab algn="l" pos="10058400"/>
               </a:tabLst>
             </a:pPr>
-            <a:fld id="{32BBE912-B532-41B1-9856-8CEC10CDF3AA}" type="slidenum">
+            <a:fld id="{2CCCA7F2-C620-47D3-9183-16693B9B9263}" type="slidenum">
               <a:rPr b="1" lang="en-US" sz="1800" spc="-1" strike="noStrike">
                 <a:solidFill>
                   <a:srgbClr val="42679b"/>
@@ -3015,7 +3015,7 @@
           <a:p>
             <a:pPr marL="432000" indent="-324000">
               <a:spcBef>
-                <a:spcPts val="1417"/>
+                <a:spcPts val="1414"/>
               </a:spcBef>
               <a:buClr>
                 <a:srgbClr val="000000"/>
@@ -3225,7 +3225,7 @@
         <p:spPr>
           <a:xfrm>
             <a:off x="0" y="6324480"/>
-            <a:ext cx="8731800" cy="322920"/>
+            <a:ext cx="8731440" cy="322560"/>
           </a:xfrm>
           <a:prstGeom prst="rect">
             <a:avLst/>
@@ -3249,7 +3249,7 @@
         <p:spPr>
           <a:xfrm>
             <a:off x="1941480" y="1609560"/>
-            <a:ext cx="7201440" cy="4637880"/>
+            <a:ext cx="7201080" cy="4637520"/>
           </a:xfrm>
           <a:prstGeom prst="rect">
             <a:avLst/>
@@ -3268,7 +3268,7 @@
         <p:spPr>
           <a:xfrm>
             <a:off x="457200" y="914400"/>
-            <a:ext cx="8685720" cy="227520"/>
+            <a:ext cx="8685360" cy="227160"/>
           </a:xfrm>
           <a:custGeom>
             <a:avLst/>
@@ -3328,7 +3328,7 @@
         <p:spPr>
           <a:xfrm>
             <a:off x="8190000" y="6415200"/>
-            <a:ext cx="1160280" cy="367560"/>
+            <a:ext cx="1159920" cy="367560"/>
           </a:xfrm>
           <a:custGeom>
             <a:avLst/>
@@ -3391,7 +3391,7 @@
                 <a:tab algn="l" pos="10058400"/>
               </a:tabLst>
             </a:pPr>
-            <a:fld id="{1793905F-C237-4CA1-BAAB-FA4C4595C90A}" type="slidenum">
+            <a:fld id="{1E59A092-3206-4D4D-BCDD-D2AF6D480E15}" type="slidenum">
               <a:rPr b="1" lang="en-US" sz="1800" spc="-1" strike="noStrike">
                 <a:solidFill>
                   <a:srgbClr val="42679b"/>
@@ -3470,7 +3470,7 @@
           <a:p>
             <a:pPr marL="432000" indent="-324000">
               <a:spcBef>
-                <a:spcPts val="1417"/>
+                <a:spcPts val="1414"/>
               </a:spcBef>
               <a:buClr>
                 <a:srgbClr val="000000"/>
@@ -3676,7 +3676,7 @@
         <p:spPr>
           <a:xfrm>
             <a:off x="461880" y="1143000"/>
-            <a:ext cx="8152560" cy="4482720"/>
+            <a:ext cx="8152200" cy="4604040"/>
           </a:xfrm>
           <a:custGeom>
             <a:avLst/>
@@ -3749,7 +3749,7 @@
               </a:rPr>
               <a:t>ДИПЛОМНАЯ РАБОТА</a:t>
             </a:r>
-            <a:endParaRPr b="0" lang="ru-RU" sz="4000" spc="-1" strike="noStrike">
+            <a:endParaRPr b="0" lang="en-US" sz="4000" spc="-1" strike="noStrike">
               <a:latin typeface="Arial"/>
             </a:endParaRPr>
           </a:p>
@@ -3773,7 +3773,7 @@
                 <a:tab algn="l" pos="10058400"/>
               </a:tabLst>
             </a:pPr>
-            <a:endParaRPr b="0" lang="ru-RU" sz="4000" spc="-1" strike="noStrike">
+            <a:endParaRPr b="0" lang="en-US" sz="4000" spc="-1" strike="noStrike">
               <a:latin typeface="Arial"/>
             </a:endParaRPr>
           </a:p>
@@ -3797,7 +3797,7 @@
                 <a:tab algn="l" pos="10058400"/>
               </a:tabLst>
             </a:pPr>
-            <a:endParaRPr b="0" lang="ru-RU" sz="4000" spc="-1" strike="noStrike">
+            <a:endParaRPr b="0" lang="en-US" sz="4000" spc="-1" strike="noStrike">
               <a:latin typeface="Arial"/>
             </a:endParaRPr>
           </a:p>
@@ -3821,7 +3821,7 @@
                 <a:tab algn="l" pos="10058400"/>
               </a:tabLst>
             </a:pPr>
-            <a:endParaRPr b="0" lang="ru-RU" sz="4000" spc="-1" strike="noStrike">
+            <a:endParaRPr b="0" lang="en-US" sz="4000" spc="-1" strike="noStrike">
               <a:latin typeface="Arial"/>
             </a:endParaRPr>
           </a:p>
@@ -3855,7 +3855,7 @@
               </a:rPr>
               <a:t>«Разработка информационной системы</a:t>
             </a:r>
-            <a:endParaRPr b="0" lang="ru-RU" sz="2400" spc="-1" strike="noStrike">
+            <a:endParaRPr b="0" lang="en-US" sz="2400" spc="-1" strike="noStrike">
               <a:latin typeface="Arial"/>
             </a:endParaRPr>
           </a:p>
@@ -3889,7 +3889,7 @@
               </a:rPr>
               <a:t>управления аварийно-профилактической группой»</a:t>
             </a:r>
-            <a:endParaRPr b="0" lang="ru-RU" sz="2400" spc="-1" strike="noStrike">
+            <a:endParaRPr b="0" lang="en-US" sz="2400" spc="-1" strike="noStrike">
               <a:latin typeface="Arial"/>
             </a:endParaRPr>
           </a:p>
@@ -3913,7 +3913,7 @@
                 <a:tab algn="l" pos="10058400"/>
               </a:tabLst>
             </a:pPr>
-            <a:endParaRPr b="0" lang="ru-RU" sz="2400" spc="-1" strike="noStrike">
+            <a:endParaRPr b="0" lang="en-US" sz="2400" spc="-1" strike="noStrike">
               <a:latin typeface="Arial"/>
             </a:endParaRPr>
           </a:p>
@@ -3937,7 +3937,7 @@
                 <a:tab algn="l" pos="10058400"/>
               </a:tabLst>
             </a:pPr>
-            <a:endParaRPr b="0" lang="ru-RU" sz="2400" spc="-1" strike="noStrike">
+            <a:endParaRPr b="0" lang="en-US" sz="2400" spc="-1" strike="noStrike">
               <a:latin typeface="Arial"/>
             </a:endParaRPr>
           </a:p>
@@ -4011,7 +4011,7 @@
               </a:rPr>
               <a:t>Студент группы ИС-17</a:t>
             </a:r>
-            <a:endParaRPr b="0" lang="ru-RU" sz="2000" spc="-1" strike="noStrike">
+            <a:endParaRPr b="0" lang="en-US" sz="2000" spc="-1" strike="noStrike">
               <a:latin typeface="Arial"/>
             </a:endParaRPr>
           </a:p>
@@ -4085,7 +4085,7 @@
               </a:rPr>
               <a:t>Прядкин Д.Н.</a:t>
             </a:r>
-            <a:endParaRPr b="0" lang="ru-RU" sz="2000" spc="-1" strike="noStrike">
+            <a:endParaRPr b="0" lang="en-US" sz="2000" spc="-1" strike="noStrike">
               <a:latin typeface="Arial"/>
             </a:endParaRPr>
           </a:p>
@@ -4100,7 +4100,7 @@
         <p:spPr>
           <a:xfrm>
             <a:off x="8305920" y="6477120"/>
-            <a:ext cx="532080" cy="227520"/>
+            <a:ext cx="531720" cy="227160"/>
           </a:xfrm>
           <a:prstGeom prst="rect">
             <a:avLst/>
@@ -4135,13 +4135,6 @@
 <file path=ppt/slides/slide2.xml><?xml version="1.0" encoding="utf-8"?>
 <p:sld xmlns:a="http://schemas.openxmlformats.org/drawingml/2006/main" xmlns:p="http://schemas.openxmlformats.org/presentationml/2006/main" xmlns:r="http://schemas.openxmlformats.org/officeDocument/2006/relationships" xmlns:p14="http://schemas.microsoft.com/office/powerpoint/2010/main" xmlns:p15="http://schemas.microsoft.com/office/powerpoint/2012/main" xmlns:mc="http://schemas.openxmlformats.org/markup-compatibility/2006">
   <p:cSld>
-    <p:bg>
-      <p:bgPr>
-        <a:solidFill>
-          <a:srgbClr val="ffffff"/>
-        </a:solidFill>
-      </p:bgPr>
-    </p:bg>
     <p:spTree>
       <p:nvGrpSpPr>
         <p:cNvPr id="1" name=""/>
@@ -4165,7 +4158,7 @@
         <p:spPr>
           <a:xfrm>
             <a:off x="457200" y="274320"/>
-            <a:ext cx="8228520" cy="562320"/>
+            <a:ext cx="8228160" cy="561960"/>
           </a:xfrm>
           <a:prstGeom prst="rect">
             <a:avLst/>
@@ -4191,7 +4184,7 @@
         <p:spPr>
           <a:xfrm>
             <a:off x="228600" y="1219320"/>
-            <a:ext cx="6933240" cy="4905720"/>
+            <a:ext cx="6932880" cy="4905360"/>
           </a:xfrm>
           <a:prstGeom prst="rect">
             <a:avLst/>
@@ -4212,7 +4205,7 @@
             <a:normAutofit/>
           </a:bodyPr>
           <a:p>
-            <a:pPr marL="342720" indent="-341640">
+            <a:pPr marL="342720" indent="-341280">
               <a:lnSpc>
                 <a:spcPct val="90000"/>
               </a:lnSpc>
@@ -4223,12 +4216,12 @@
                 <a:tab algn="l" pos="0"/>
               </a:tabLst>
             </a:pPr>
-            <a:endParaRPr b="0" lang="ru-RU" sz="1800" spc="-1" strike="noStrike">
-              <a:latin typeface="Arial"/>
-            </a:endParaRPr>
-          </a:p>
-          <a:p>
-            <a:pPr marL="342720" indent="-341640" algn="just">
+            <a:endParaRPr b="0" lang="en-US" sz="1800" spc="-1" strike="noStrike">
+              <a:latin typeface="Arial"/>
+            </a:endParaRPr>
+          </a:p>
+          <a:p>
+            <a:pPr marL="342720" indent="-341280" algn="just">
               <a:lnSpc>
                 <a:spcPct val="90000"/>
               </a:lnSpc>
@@ -4236,7 +4229,7 @@
                 <a:tab algn="l" pos="0"/>
               </a:tabLst>
             </a:pPr>
-            <a:endParaRPr b="0" lang="ru-RU" sz="1800" spc="-1" strike="noStrike">
+            <a:endParaRPr b="0" lang="en-US" sz="1800" spc="-1" strike="noStrike">
               <a:latin typeface="Arial"/>
             </a:endParaRPr>
           </a:p>
@@ -4251,7 +4244,7 @@
         <p:spPr>
           <a:xfrm>
             <a:off x="685800" y="1371600"/>
-            <a:ext cx="7772400" cy="4343040"/>
+            <a:ext cx="7772040" cy="4342680"/>
           </a:xfrm>
           <a:prstGeom prst="rect">
             <a:avLst/>
@@ -4297,7 +4290,7 @@
               </a:rPr>
               <a:t>– проектирование и разработка информационной системы управления аварийно-профилактической группой.</a:t>
             </a:r>
-            <a:endParaRPr b="0" lang="ru-RU" sz="2400" spc="-1" strike="noStrike">
+            <a:endParaRPr b="0" lang="en-US" sz="2400" spc="-1" strike="noStrike">
               <a:latin typeface="Arial"/>
             </a:endParaRPr>
           </a:p>
@@ -4307,7 +4300,7 @@
                 <a:spcPct val="100000"/>
               </a:lnSpc>
             </a:pPr>
-            <a:endParaRPr b="0" lang="ru-RU" sz="2400" spc="-1" strike="noStrike">
+            <a:endParaRPr b="0" lang="en-US" sz="2400" spc="-1" strike="noStrike">
               <a:latin typeface="Arial"/>
             </a:endParaRPr>
           </a:p>
@@ -4337,7 +4330,7 @@
               </a:rPr>
               <a:t> – информационная система управления аварийно-профилактической группой.</a:t>
             </a:r>
-            <a:endParaRPr b="0" lang="ru-RU" sz="2400" spc="-1" strike="noStrike">
+            <a:endParaRPr b="0" lang="en-US" sz="2400" spc="-1" strike="noStrike">
               <a:latin typeface="Arial"/>
             </a:endParaRPr>
           </a:p>
@@ -4347,7 +4340,7 @@
                 <a:spcPct val="100000"/>
               </a:lnSpc>
             </a:pPr>
-            <a:endParaRPr b="0" lang="ru-RU" sz="2400" spc="-1" strike="noStrike">
+            <a:endParaRPr b="0" lang="en-US" sz="2400" spc="-1" strike="noStrike">
               <a:latin typeface="Arial"/>
             </a:endParaRPr>
           </a:p>
@@ -4377,7 +4370,7 @@
               </a:rPr>
               <a:t> – применение современных информационных технологий для создания информационной системы управления аварийно-профилактической группой.</a:t>
             </a:r>
-            <a:endParaRPr b="0" lang="ru-RU" sz="2400" spc="-1" strike="noStrike">
+            <a:endParaRPr b="0" lang="en-US" sz="2400" spc="-1" strike="noStrike">
               <a:latin typeface="Arial"/>
             </a:endParaRPr>
           </a:p>
@@ -4392,7 +4385,7 @@
         <p:spPr>
           <a:xfrm>
             <a:off x="457200" y="274320"/>
-            <a:ext cx="8228520" cy="562320"/>
+            <a:ext cx="8228160" cy="561960"/>
           </a:xfrm>
           <a:prstGeom prst="rect">
             <a:avLst/>
@@ -4413,7 +4406,11 @@
             <a:noAutofit/>
           </a:bodyPr>
           <a:p>
-            <a:pPr algn="just"/>
+            <a:pPr algn="ctr">
+              <a:lnSpc>
+                <a:spcPct val="100000"/>
+              </a:lnSpc>
+            </a:pPr>
             <a:r>
               <a:rPr b="0" lang="ru-RU" sz="3200" spc="-1" strike="noStrike">
                 <a:solidFill>
@@ -4424,7 +4421,7 @@
               </a:rPr>
               <a:t>Цель, объект и предмет исследования</a:t>
             </a:r>
-            <a:endParaRPr b="0" lang="ru-RU" sz="3200" spc="-1" strike="noStrike">
+            <a:endParaRPr b="0" lang="en-US" sz="3200" spc="-1" strike="noStrike">
               <a:latin typeface="Arial"/>
             </a:endParaRPr>
           </a:p>
@@ -4469,7 +4466,7 @@
         <p:spPr>
           <a:xfrm>
             <a:off x="457200" y="274320"/>
-            <a:ext cx="8228520" cy="562320"/>
+            <a:ext cx="8228160" cy="561960"/>
           </a:xfrm>
           <a:prstGeom prst="rect">
             <a:avLst/>
@@ -4495,7 +4492,7 @@
         <p:spPr>
           <a:xfrm>
             <a:off x="228600" y="1219320"/>
-            <a:ext cx="6933240" cy="4905720"/>
+            <a:ext cx="6932880" cy="4905360"/>
           </a:xfrm>
           <a:prstGeom prst="rect">
             <a:avLst/>
@@ -4516,7 +4513,7 @@
             <a:normAutofit/>
           </a:bodyPr>
           <a:p>
-            <a:pPr marL="342720" indent="-341640">
+            <a:pPr marL="342720" indent="-341280">
               <a:lnSpc>
                 <a:spcPct val="90000"/>
               </a:lnSpc>
@@ -4527,12 +4524,12 @@
                 <a:tab algn="l" pos="0"/>
               </a:tabLst>
             </a:pPr>
-            <a:endParaRPr b="0" lang="ru-RU" sz="1800" spc="-1" strike="noStrike">
-              <a:latin typeface="Arial"/>
-            </a:endParaRPr>
-          </a:p>
-          <a:p>
-            <a:pPr marL="342720" indent="-341640" algn="just">
+            <a:endParaRPr b="0" lang="en-US" sz="1800" spc="-1" strike="noStrike">
+              <a:latin typeface="Arial"/>
+            </a:endParaRPr>
+          </a:p>
+          <a:p>
+            <a:pPr marL="342720" indent="-341280" algn="just">
               <a:lnSpc>
                 <a:spcPct val="90000"/>
               </a:lnSpc>
@@ -4540,7 +4537,7 @@
                 <a:tab algn="l" pos="0"/>
               </a:tabLst>
             </a:pPr>
-            <a:endParaRPr b="0" lang="ru-RU" sz="1800" spc="-1" strike="noStrike">
+            <a:endParaRPr b="0" lang="en-US" sz="1800" spc="-1" strike="noStrike">
               <a:latin typeface="Arial"/>
             </a:endParaRPr>
           </a:p>
@@ -4555,7 +4552,7 @@
         <p:spPr>
           <a:xfrm>
             <a:off x="457200" y="1219320"/>
-            <a:ext cx="8229600" cy="4495320"/>
+            <a:ext cx="8229240" cy="4494960"/>
           </a:xfrm>
           <a:prstGeom prst="rect">
             <a:avLst/>
@@ -4576,7 +4573,7 @@
             <a:noAutofit/>
           </a:bodyPr>
           <a:p>
-            <a:pPr marL="216000" indent="-216000">
+            <a:pPr marL="216000" indent="-215640">
               <a:lnSpc>
                 <a:spcPct val="100000"/>
               </a:lnSpc>
@@ -4600,33 +4597,25 @@
               </a:rPr>
               <a:t>изучить основные характеристики систем управления работами, определить их задачи и функции;</a:t>
             </a:r>
-            <a:endParaRPr b="0" lang="ru-RU" sz="2400" spc="-1" strike="noStrike">
-              <a:latin typeface="Arial"/>
-              <a:ea typeface="Microsoft YaHei"/>
-            </a:endParaRPr>
-          </a:p>
-          <a:p>
-            <a:pPr marL="216000" indent="-216000" algn="just">
+            <a:endParaRPr b="0" lang="en-US" sz="2400" spc="-1" strike="noStrike">
+              <a:latin typeface="Arial"/>
+            </a:endParaRPr>
+          </a:p>
+          <a:p>
+            <a:pPr algn="just">
               <a:lnSpc>
                 <a:spcPct val="100000"/>
               </a:lnSpc>
-              <a:buClr>
-                <a:srgbClr val="000000"/>
-              </a:buClr>
-              <a:buSzPct val="45000"/>
-              <a:buFont typeface="Wingdings" charset="2"/>
-              <a:buChar char=""/>
               <a:tabLst>
                 <a:tab algn="l" pos="540360"/>
               </a:tabLst>
             </a:pPr>
-            <a:endParaRPr b="0" lang="ru-RU" sz="2400" spc="-1" strike="noStrike">
-              <a:latin typeface="Arial"/>
-              <a:ea typeface="Microsoft YaHei"/>
-            </a:endParaRPr>
-          </a:p>
-          <a:p>
-            <a:pPr marL="216000" indent="-216000">
+            <a:endParaRPr b="0" lang="en-US" sz="2400" spc="-1" strike="noStrike">
+              <a:latin typeface="Arial"/>
+            </a:endParaRPr>
+          </a:p>
+          <a:p>
+            <a:pPr marL="216000" indent="-215640">
               <a:lnSpc>
                 <a:spcPct val="100000"/>
               </a:lnSpc>
@@ -4650,13 +4639,25 @@
               </a:rPr>
               <a:t>обозначить аудиторию и предметную область разрабатываемой системы управления аварийно-профилактической группой, функции, которые она будет выполнять; определить информационную составляющую;</a:t>
             </a:r>
-            <a:endParaRPr b="0" lang="ru-RU" sz="2400" spc="-1" strike="noStrike">
-              <a:latin typeface="Arial"/>
-              <a:ea typeface="Microsoft YaHei"/>
-            </a:endParaRPr>
-          </a:p>
-          <a:p>
-            <a:pPr marL="216000" indent="-216000" algn="just">
+            <a:endParaRPr b="0" lang="en-US" sz="2400" spc="-1" strike="noStrike">
+              <a:latin typeface="Arial"/>
+            </a:endParaRPr>
+          </a:p>
+          <a:p>
+            <a:pPr algn="just">
+              <a:lnSpc>
+                <a:spcPct val="100000"/>
+              </a:lnSpc>
+              <a:tabLst>
+                <a:tab algn="l" pos="540360"/>
+              </a:tabLst>
+            </a:pPr>
+            <a:endParaRPr b="0" lang="en-US" sz="2400" spc="-1" strike="noStrike">
+              <a:latin typeface="Arial"/>
+            </a:endParaRPr>
+          </a:p>
+          <a:p>
+            <a:pPr marL="216000" indent="-215640">
               <a:lnSpc>
                 <a:spcPct val="100000"/>
               </a:lnSpc>
@@ -4670,23 +4671,6 @@
                 <a:tab algn="l" pos="540360"/>
               </a:tabLst>
             </a:pPr>
-            <a:endParaRPr b="0" lang="ru-RU" sz="2400" spc="-1" strike="noStrike">
-              <a:latin typeface="Arial"/>
-              <a:ea typeface="Microsoft YaHei"/>
-            </a:endParaRPr>
-          </a:p>
-          <a:p>
-            <a:pPr marL="216000" indent="-216000">
-              <a:lnSpc>
-                <a:spcPct val="100000"/>
-              </a:lnSpc>
-              <a:buClr>
-                <a:srgbClr val="000000"/>
-              </a:buClr>
-              <a:buSzPct val="45000"/>
-              <a:buFont typeface="Wingdings" charset="2"/>
-              <a:buChar char=""/>
-            </a:pPr>
             <a:r>
               <a:rPr b="0" i="1" lang="ru-RU" sz="2400" spc="-1" strike="noStrike">
                 <a:solidFill>
@@ -4697,9 +4681,8 @@
               </a:rPr>
               <a:t>выбрать программные средства и разработать систему управления аварийно-профилактической группой.</a:t>
             </a:r>
-            <a:endParaRPr b="0" lang="ru-RU" sz="2400" spc="-1" strike="noStrike">
-              <a:latin typeface="Arial"/>
-              <a:ea typeface="Microsoft YaHei"/>
+            <a:endParaRPr b="0" lang="en-US" sz="2400" spc="-1" strike="noStrike">
+              <a:latin typeface="Arial"/>
             </a:endParaRPr>
           </a:p>
         </p:txBody>
@@ -4713,7 +4696,7 @@
         <p:spPr>
           <a:xfrm>
             <a:off x="457200" y="274320"/>
-            <a:ext cx="8228520" cy="562320"/>
+            <a:ext cx="8228160" cy="561960"/>
           </a:xfrm>
           <a:prstGeom prst="rect">
             <a:avLst/>
@@ -4734,7 +4717,11 @@
             <a:noAutofit/>
           </a:bodyPr>
           <a:p>
-            <a:pPr algn="ctr"/>
+            <a:pPr algn="ctr">
+              <a:lnSpc>
+                <a:spcPct val="100000"/>
+              </a:lnSpc>
+            </a:pPr>
             <a:r>
               <a:rPr b="0" lang="ru-RU" sz="3200" spc="-1" strike="noStrike">
                 <a:solidFill>
@@ -4745,7 +4732,7 @@
               </a:rPr>
               <a:t>Основные задачи</a:t>
             </a:r>
-            <a:endParaRPr b="0" lang="ru-RU" sz="3200" spc="-1" strike="noStrike">
+            <a:endParaRPr b="0" lang="en-US" sz="3200" spc="-1" strike="noStrike">
               <a:latin typeface="Arial"/>
             </a:endParaRPr>
           </a:p>
@@ -4790,7 +4777,7 @@
         <p:spPr>
           <a:xfrm>
             <a:off x="457200" y="274320"/>
-            <a:ext cx="8228520" cy="562320"/>
+            <a:ext cx="8228160" cy="561960"/>
           </a:xfrm>
           <a:prstGeom prst="rect">
             <a:avLst/>
@@ -4816,7 +4803,7 @@
         <p:spPr>
           <a:xfrm>
             <a:off x="228600" y="1219320"/>
-            <a:ext cx="6933240" cy="4905720"/>
+            <a:ext cx="6932880" cy="4905360"/>
           </a:xfrm>
           <a:prstGeom prst="rect">
             <a:avLst/>
@@ -4837,7 +4824,7 @@
             <a:normAutofit/>
           </a:bodyPr>
           <a:p>
-            <a:pPr marL="342720" indent="-341640">
+            <a:pPr marL="342720" indent="-341280">
               <a:lnSpc>
                 <a:spcPct val="90000"/>
               </a:lnSpc>
@@ -4848,12 +4835,12 @@
                 <a:tab algn="l" pos="0"/>
               </a:tabLst>
             </a:pPr>
-            <a:endParaRPr b="0" lang="ru-RU" sz="1800" spc="-1" strike="noStrike">
-              <a:latin typeface="Arial"/>
-            </a:endParaRPr>
-          </a:p>
-          <a:p>
-            <a:pPr marL="342720" indent="-341640" algn="just">
+            <a:endParaRPr b="0" lang="en-US" sz="1800" spc="-1" strike="noStrike">
+              <a:latin typeface="Arial"/>
+            </a:endParaRPr>
+          </a:p>
+          <a:p>
+            <a:pPr marL="342720" indent="-341280" algn="just">
               <a:lnSpc>
                 <a:spcPct val="90000"/>
               </a:lnSpc>
@@ -4861,7 +4848,7 @@
                 <a:tab algn="l" pos="0"/>
               </a:tabLst>
             </a:pPr>
-            <a:endParaRPr b="0" lang="ru-RU" sz="1800" spc="-1" strike="noStrike">
+            <a:endParaRPr b="0" lang="en-US" sz="1800" spc="-1" strike="noStrike">
               <a:latin typeface="Arial"/>
             </a:endParaRPr>
           </a:p>
@@ -4876,7 +4863,7 @@
         <p:spPr>
           <a:xfrm>
             <a:off x="457200" y="274320"/>
-            <a:ext cx="8228520" cy="562320"/>
+            <a:ext cx="8228160" cy="561960"/>
           </a:xfrm>
           <a:prstGeom prst="rect">
             <a:avLst/>
@@ -4897,7 +4884,11 @@
             <a:noAutofit/>
           </a:bodyPr>
           <a:p>
-            <a:pPr algn="ctr"/>
+            <a:pPr algn="ctr">
+              <a:lnSpc>
+                <a:spcPct val="100000"/>
+              </a:lnSpc>
+            </a:pPr>
             <a:r>
               <a:rPr b="0" lang="ru-RU" sz="3200" spc="-1" strike="noStrike">
                 <a:solidFill>
@@ -4908,7 +4899,7 @@
               </a:rPr>
               <a:t>Диаграмма прецедентов</a:t>
             </a:r>
-            <a:endParaRPr b="0" lang="ru-RU" sz="3200" spc="-1" strike="noStrike">
+            <a:endParaRPr b="0" lang="en-US" sz="3200" spc="-1" strike="noStrike">
               <a:latin typeface="Arial"/>
             </a:endParaRPr>
           </a:p>
@@ -4927,7 +4918,7 @@
         <p:spPr>
           <a:xfrm>
             <a:off x="685800" y="1055160"/>
-            <a:ext cx="4114800" cy="5423400"/>
+            <a:ext cx="4114440" cy="5423040"/>
           </a:xfrm>
           <a:prstGeom prst="rect">
             <a:avLst/>
@@ -4950,7 +4941,7 @@
         <p:spPr>
           <a:xfrm>
             <a:off x="5069520" y="1600200"/>
-            <a:ext cx="3357360" cy="3886200"/>
+            <a:ext cx="3357000" cy="3885840"/>
           </a:xfrm>
           <a:prstGeom prst="rect">
             <a:avLst/>
@@ -4999,7 +4990,7 @@
         <p:spPr>
           <a:xfrm>
             <a:off x="457200" y="274320"/>
-            <a:ext cx="8228520" cy="562320"/>
+            <a:ext cx="8228160" cy="561960"/>
           </a:xfrm>
           <a:prstGeom prst="rect">
             <a:avLst/>
@@ -5020,7 +5011,11 @@
             <a:noAutofit/>
           </a:bodyPr>
           <a:p>
-            <a:pPr algn="just"/>
+            <a:pPr algn="just">
+              <a:lnSpc>
+                <a:spcPct val="100000"/>
+              </a:lnSpc>
+            </a:pPr>
             <a:r>
               <a:rPr b="0" lang="ru-RU" sz="3200" spc="-1" strike="noStrike">
                 <a:solidFill>
@@ -5031,7 +5026,7 @@
               </a:rPr>
               <a:t>Даталогическая модель базы данных</a:t>
             </a:r>
-            <a:endParaRPr b="0" lang="ru-RU" sz="3200" spc="-1" strike="noStrike">
+            <a:endParaRPr b="0" lang="en-US" sz="3200" spc="-1" strike="noStrike">
               <a:latin typeface="Arial"/>
             </a:endParaRPr>
           </a:p>
@@ -5046,7 +5041,7 @@
         <p:spPr>
           <a:xfrm>
             <a:off x="228600" y="1219320"/>
-            <a:ext cx="6933240" cy="4905720"/>
+            <a:ext cx="6932880" cy="4905360"/>
           </a:xfrm>
           <a:prstGeom prst="rect">
             <a:avLst/>
@@ -5067,7 +5062,7 @@
             <a:normAutofit/>
           </a:bodyPr>
           <a:p>
-            <a:pPr marL="342720" indent="-341640">
+            <a:pPr marL="342720" indent="-341280">
               <a:lnSpc>
                 <a:spcPct val="90000"/>
               </a:lnSpc>
@@ -5078,12 +5073,12 @@
                 <a:tab algn="l" pos="0"/>
               </a:tabLst>
             </a:pPr>
-            <a:endParaRPr b="0" lang="ru-RU" sz="1800" spc="-1" strike="noStrike">
-              <a:latin typeface="Arial"/>
-            </a:endParaRPr>
-          </a:p>
-          <a:p>
-            <a:pPr marL="342720" indent="-341640" algn="just">
+            <a:endParaRPr b="0" lang="en-US" sz="1800" spc="-1" strike="noStrike">
+              <a:latin typeface="Arial"/>
+            </a:endParaRPr>
+          </a:p>
+          <a:p>
+            <a:pPr marL="342720" indent="-341280" algn="just">
               <a:lnSpc>
                 <a:spcPct val="90000"/>
               </a:lnSpc>
@@ -5091,7 +5086,7 @@
                 <a:tab algn="l" pos="0"/>
               </a:tabLst>
             </a:pPr>
-            <a:endParaRPr b="0" lang="ru-RU" sz="1800" spc="-1" strike="noStrike">
+            <a:endParaRPr b="0" lang="en-US" sz="1800" spc="-1" strike="noStrike">
               <a:latin typeface="Arial"/>
             </a:endParaRPr>
           </a:p>
@@ -5110,7 +5105,7 @@
         <p:spPr>
           <a:xfrm>
             <a:off x="1371600" y="1061280"/>
-            <a:ext cx="6629400" cy="5339520"/>
+            <a:ext cx="6629040" cy="5339160"/>
           </a:xfrm>
           <a:prstGeom prst="rect">
             <a:avLst/>
@@ -5136,13 +5131,6 @@
 <file path=ppt/slides/slide6.xml><?xml version="1.0" encoding="utf-8"?>
 <p:sld xmlns:a="http://schemas.openxmlformats.org/drawingml/2006/main" xmlns:p="http://schemas.openxmlformats.org/presentationml/2006/main" xmlns:r="http://schemas.openxmlformats.org/officeDocument/2006/relationships" xmlns:p14="http://schemas.microsoft.com/office/powerpoint/2010/main" xmlns:p15="http://schemas.microsoft.com/office/powerpoint/2012/main" xmlns:mc="http://schemas.openxmlformats.org/markup-compatibility/2006">
   <p:cSld>
-    <p:bg>
-      <p:bgPr>
-        <a:solidFill>
-          <a:srgbClr val="ffffff"/>
-        </a:solidFill>
-      </p:bgPr>
-    </p:bg>
     <p:spTree>
       <p:nvGrpSpPr>
         <p:cNvPr id="1" name=""/>
@@ -5166,7 +5154,7 @@
         <p:spPr>
           <a:xfrm>
             <a:off x="457200" y="274320"/>
-            <a:ext cx="8228520" cy="562320"/>
+            <a:ext cx="8228160" cy="561960"/>
           </a:xfrm>
           <a:prstGeom prst="rect">
             <a:avLst/>
@@ -5247,7 +5235,7 @@
         <p:spPr>
           <a:xfrm>
             <a:off x="228600" y="1219320"/>
-            <a:ext cx="6933240" cy="4905720"/>
+            <a:ext cx="6932880" cy="4905360"/>
           </a:xfrm>
           <a:prstGeom prst="rect">
             <a:avLst/>
@@ -5268,7 +5256,7 @@
             <a:normAutofit/>
           </a:bodyPr>
           <a:p>
-            <a:pPr marL="342720" indent="-341640">
+            <a:pPr marL="342720" indent="-341280">
               <a:lnSpc>
                 <a:spcPct val="90000"/>
               </a:lnSpc>
@@ -5279,12 +5267,12 @@
                 <a:tab algn="l" pos="0"/>
               </a:tabLst>
             </a:pPr>
-            <a:endParaRPr b="0" lang="ru-RU" sz="1800" spc="-1" strike="noStrike">
-              <a:latin typeface="Arial"/>
-            </a:endParaRPr>
-          </a:p>
-          <a:p>
-            <a:pPr marL="342720" indent="-341640" algn="just">
+            <a:endParaRPr b="0" lang="en-US" sz="1800" spc="-1" strike="noStrike">
+              <a:latin typeface="Arial"/>
+            </a:endParaRPr>
+          </a:p>
+          <a:p>
+            <a:pPr marL="342720" indent="-341280" algn="just">
               <a:lnSpc>
                 <a:spcPct val="90000"/>
               </a:lnSpc>
@@ -5292,7 +5280,7 @@
                 <a:tab algn="l" pos="0"/>
               </a:tabLst>
             </a:pPr>
-            <a:endParaRPr b="0" lang="ru-RU" sz="1800" spc="-1" strike="noStrike">
+            <a:endParaRPr b="0" lang="en-US" sz="1800" spc="-1" strike="noStrike">
               <a:latin typeface="Arial"/>
             </a:endParaRPr>
           </a:p>
@@ -5311,7 +5299,7 @@
         <p:spPr>
           <a:xfrm>
             <a:off x="1600200" y="1838520"/>
-            <a:ext cx="6076440" cy="2962080"/>
+            <a:ext cx="6076080" cy="2961720"/>
           </a:xfrm>
           <a:prstGeom prst="rect">
             <a:avLst/>
@@ -5337,13 +5325,6 @@
 <file path=ppt/slides/slide7.xml><?xml version="1.0" encoding="utf-8"?>
 <p:sld xmlns:a="http://schemas.openxmlformats.org/drawingml/2006/main" xmlns:p="http://schemas.openxmlformats.org/presentationml/2006/main" xmlns:r="http://schemas.openxmlformats.org/officeDocument/2006/relationships" xmlns:p14="http://schemas.microsoft.com/office/powerpoint/2010/main" xmlns:p15="http://schemas.microsoft.com/office/powerpoint/2012/main" xmlns:mc="http://schemas.openxmlformats.org/markup-compatibility/2006">
   <p:cSld>
-    <p:bg>
-      <p:bgPr>
-        <a:solidFill>
-          <a:srgbClr val="ffffff"/>
-        </a:solidFill>
-      </p:bgPr>
-    </p:bg>
     <p:spTree>
       <p:nvGrpSpPr>
         <p:cNvPr id="1" name=""/>
@@ -5367,7 +5348,7 @@
         <p:spPr>
           <a:xfrm>
             <a:off x="457200" y="274320"/>
-            <a:ext cx="8228520" cy="562320"/>
+            <a:ext cx="8228160" cy="561960"/>
           </a:xfrm>
           <a:prstGeom prst="rect">
             <a:avLst/>
@@ -5418,7 +5399,7 @@
         <p:spPr>
           <a:xfrm>
             <a:off x="228600" y="1219320"/>
-            <a:ext cx="6933240" cy="4905720"/>
+            <a:ext cx="6932880" cy="4905360"/>
           </a:xfrm>
           <a:prstGeom prst="rect">
             <a:avLst/>
@@ -5439,7 +5420,7 @@
             <a:normAutofit/>
           </a:bodyPr>
           <a:p>
-            <a:pPr marL="342720" indent="-341640">
+            <a:pPr marL="342720" indent="-341280">
               <a:lnSpc>
                 <a:spcPct val="90000"/>
               </a:lnSpc>
@@ -5450,12 +5431,12 @@
                 <a:tab algn="l" pos="0"/>
               </a:tabLst>
             </a:pPr>
-            <a:endParaRPr b="0" lang="ru-RU" sz="1800" spc="-1" strike="noStrike">
-              <a:latin typeface="Arial"/>
-            </a:endParaRPr>
-          </a:p>
-          <a:p>
-            <a:pPr marL="342720" indent="-341640" algn="just">
+            <a:endParaRPr b="0" lang="en-US" sz="1800" spc="-1" strike="noStrike">
+              <a:latin typeface="Arial"/>
+            </a:endParaRPr>
+          </a:p>
+          <a:p>
+            <a:pPr marL="342720" indent="-341280" algn="just">
               <a:lnSpc>
                 <a:spcPct val="90000"/>
               </a:lnSpc>
@@ -5463,7 +5444,7 @@
                 <a:tab algn="l" pos="0"/>
               </a:tabLst>
             </a:pPr>
-            <a:endParaRPr b="0" lang="ru-RU" sz="1800" spc="-1" strike="noStrike">
+            <a:endParaRPr b="0" lang="en-US" sz="1800" spc="-1" strike="noStrike">
               <a:latin typeface="Arial"/>
             </a:endParaRPr>
           </a:p>
@@ -5482,7 +5463,7 @@
         <p:spPr>
           <a:xfrm>
             <a:off x="1828800" y="836640"/>
-            <a:ext cx="5715000" cy="5715000"/>
+            <a:ext cx="5714640" cy="5714640"/>
           </a:xfrm>
           <a:prstGeom prst="rect">
             <a:avLst/>
@@ -5508,13 +5489,6 @@
 <file path=ppt/slides/slide8.xml><?xml version="1.0" encoding="utf-8"?>
 <p:sld xmlns:a="http://schemas.openxmlformats.org/drawingml/2006/main" xmlns:p="http://schemas.openxmlformats.org/presentationml/2006/main" xmlns:r="http://schemas.openxmlformats.org/officeDocument/2006/relationships" xmlns:p14="http://schemas.microsoft.com/office/powerpoint/2010/main" xmlns:p15="http://schemas.microsoft.com/office/powerpoint/2012/main" xmlns:mc="http://schemas.openxmlformats.org/markup-compatibility/2006">
   <p:cSld>
-    <p:bg>
-      <p:bgPr>
-        <a:solidFill>
-          <a:srgbClr val="ffffff"/>
-        </a:solidFill>
-      </p:bgPr>
-    </p:bg>
     <p:spTree>
       <p:nvGrpSpPr>
         <p:cNvPr id="1" name=""/>
@@ -5538,7 +5512,7 @@
         <p:spPr>
           <a:xfrm>
             <a:off x="457200" y="274320"/>
-            <a:ext cx="8228520" cy="562320"/>
+            <a:ext cx="8228160" cy="561960"/>
           </a:xfrm>
           <a:prstGeom prst="rect">
             <a:avLst/>
@@ -5572,17 +5546,7 @@
                 <a:latin typeface="Arial"/>
                 <a:ea typeface="Calibri"/>
               </a:rPr>
-              <a:t>Диаграмма класса </a:t>
-            </a:r>
-            <a:r>
-              <a:rPr b="0" lang="ru-RU" sz="3200" spc="-1" strike="noStrike">
-                <a:solidFill>
-                  <a:srgbClr val="42679b"/>
-                </a:solidFill>
-                <a:latin typeface="Arial"/>
-                <a:ea typeface="Calibri"/>
-              </a:rPr>
-              <a:t>View</a:t>
+              <a:t>Диаграмма класса View</a:t>
             </a:r>
             <a:endParaRPr b="0" lang="en-US" sz="3200" spc="-1" strike="noStrike">
               <a:latin typeface="Arial"/>
@@ -5599,7 +5563,7 @@
         <p:spPr>
           <a:xfrm>
             <a:off x="228600" y="1219320"/>
-            <a:ext cx="6933240" cy="4905720"/>
+            <a:ext cx="6932880" cy="4905360"/>
           </a:xfrm>
           <a:prstGeom prst="rect">
             <a:avLst/>
@@ -5620,7 +5584,7 @@
             <a:normAutofit/>
           </a:bodyPr>
           <a:p>
-            <a:pPr marL="342720" indent="-341640">
+            <a:pPr marL="342720" indent="-341280">
               <a:lnSpc>
                 <a:spcPct val="90000"/>
               </a:lnSpc>
@@ -5631,12 +5595,12 @@
                 <a:tab algn="l" pos="0"/>
               </a:tabLst>
             </a:pPr>
-            <a:endParaRPr b="0" lang="ru-RU" sz="1800" spc="-1" strike="noStrike">
-              <a:latin typeface="Arial"/>
-            </a:endParaRPr>
-          </a:p>
-          <a:p>
-            <a:pPr marL="342720" indent="-341640" algn="just">
+            <a:endParaRPr b="0" lang="en-US" sz="1800" spc="-1" strike="noStrike">
+              <a:latin typeface="Arial"/>
+            </a:endParaRPr>
+          </a:p>
+          <a:p>
+            <a:pPr marL="342720" indent="-341280" algn="just">
               <a:lnSpc>
                 <a:spcPct val="90000"/>
               </a:lnSpc>
@@ -5644,7 +5608,7 @@
                 <a:tab algn="l" pos="0"/>
               </a:tabLst>
             </a:pPr>
-            <a:endParaRPr b="0" lang="ru-RU" sz="1800" spc="-1" strike="noStrike">
+            <a:endParaRPr b="0" lang="en-US" sz="1800" spc="-1" strike="noStrike">
               <a:latin typeface="Arial"/>
             </a:endParaRPr>
           </a:p>
@@ -5663,7 +5627,7 @@
         <p:spPr>
           <a:xfrm>
             <a:off x="3596040" y="1600200"/>
-            <a:ext cx="2118960" cy="4372560"/>
+            <a:ext cx="2118600" cy="4372200"/>
           </a:xfrm>
           <a:prstGeom prst="rect">
             <a:avLst/>
@@ -5689,13 +5653,6 @@
 <file path=ppt/slides/slide9.xml><?xml version="1.0" encoding="utf-8"?>
 <p:sld xmlns:a="http://schemas.openxmlformats.org/drawingml/2006/main" xmlns:p="http://schemas.openxmlformats.org/presentationml/2006/main" xmlns:r="http://schemas.openxmlformats.org/officeDocument/2006/relationships" xmlns:p14="http://schemas.microsoft.com/office/powerpoint/2010/main" xmlns:p15="http://schemas.microsoft.com/office/powerpoint/2012/main" xmlns:mc="http://schemas.openxmlformats.org/markup-compatibility/2006">
   <p:cSld>
-    <p:bg>
-      <p:bgPr>
-        <a:solidFill>
-          <a:srgbClr val="ffffff"/>
-        </a:solidFill>
-      </p:bgPr>
-    </p:bg>
     <p:spTree>
       <p:nvGrpSpPr>
         <p:cNvPr id="1" name=""/>
@@ -5719,7 +5676,7 @@
         <p:spPr>
           <a:xfrm>
             <a:off x="457200" y="274320"/>
-            <a:ext cx="8228520" cy="562320"/>
+            <a:ext cx="8228160" cy="561960"/>
           </a:xfrm>
           <a:prstGeom prst="rect">
             <a:avLst/>
@@ -5780,7 +5737,7 @@
         <p:spPr>
           <a:xfrm>
             <a:off x="228600" y="1219320"/>
-            <a:ext cx="6933240" cy="4905720"/>
+            <a:ext cx="6932880" cy="4905360"/>
           </a:xfrm>
           <a:prstGeom prst="rect">
             <a:avLst/>
@@ -5801,7 +5758,7 @@
             <a:normAutofit/>
           </a:bodyPr>
           <a:p>
-            <a:pPr marL="342720" indent="-341640">
+            <a:pPr marL="342720" indent="-341280">
               <a:lnSpc>
                 <a:spcPct val="90000"/>
               </a:lnSpc>
@@ -5812,12 +5769,12 @@
                 <a:tab algn="l" pos="0"/>
               </a:tabLst>
             </a:pPr>
-            <a:endParaRPr b="0" lang="ru-RU" sz="1800" spc="-1" strike="noStrike">
-              <a:latin typeface="Arial"/>
-            </a:endParaRPr>
-          </a:p>
-          <a:p>
-            <a:pPr marL="342720" indent="-341640" algn="just">
+            <a:endParaRPr b="0" lang="en-US" sz="1800" spc="-1" strike="noStrike">
+              <a:latin typeface="Arial"/>
+            </a:endParaRPr>
+          </a:p>
+          <a:p>
+            <a:pPr marL="342720" indent="-341280" algn="just">
               <a:lnSpc>
                 <a:spcPct val="90000"/>
               </a:lnSpc>
@@ -5825,7 +5782,7 @@
                 <a:tab algn="l" pos="0"/>
               </a:tabLst>
             </a:pPr>
-            <a:endParaRPr b="0" lang="ru-RU" sz="1800" spc="-1" strike="noStrike">
+            <a:endParaRPr b="0" lang="en-US" sz="1800" spc="-1" strike="noStrike">
               <a:latin typeface="Arial"/>
             </a:endParaRPr>
           </a:p>
@@ -5844,7 +5801,7 @@
         <p:spPr>
           <a:xfrm>
             <a:off x="424800" y="1054080"/>
-            <a:ext cx="8294400" cy="5070960"/>
+            <a:ext cx="8294040" cy="5070600"/>
           </a:xfrm>
           <a:prstGeom prst="rect">
             <a:avLst/>

</xml_diff>